<commit_message>
git: Add HOPs for workflows topics
</commit_message>
<xml_diff>
--- a/diagrams/revisionControl/forkingWorkflow/diagram.pptx
+++ b/diagrams/revisionControl/forkingWorkflow/diagram.pptx
@@ -104,6 +104,22 @@
       </a:defRPr>
     </a:lvl9pPr>
   </p:defaultTextStyle>
+  <p:extLst>
+    <p:ext uri="{EFAFB233-063F-42B5-8137-9DF3F51BA10A}">
+      <p15:sldGuideLst xmlns:p15="http://schemas.microsoft.com/office/powerpoint/2012/main">
+        <p15:guide id="1" orient="horz" pos="2160">
+          <p15:clr>
+            <a:srgbClr val="A4A3A4"/>
+          </p15:clr>
+        </p15:guide>
+        <p15:guide id="2" pos="2880">
+          <p15:clr>
+            <a:srgbClr val="A4A3A4"/>
+          </p15:clr>
+        </p15:guide>
+      </p15:sldGuideLst>
+    </p:ext>
+  </p:extLst>
 </p:presentation>
 </file>
 
@@ -145,7 +161,7 @@
           <a:lstStyle/>
           <a:p>
             <a:r>
-              <a:rPr lang="en-US" smtClean="0"/>
+              <a:rPr lang="en-US"/>
               <a:t>Click to edit Master title style</a:t>
             </a:r>
             <a:endParaRPr lang="en-SG"/>
@@ -264,7 +280,7 @@
           </a:lstStyle>
           <a:p>
             <a:r>
-              <a:rPr lang="en-US" smtClean="0"/>
+              <a:rPr lang="en-US"/>
               <a:t>Click to edit Master subtitle style</a:t>
             </a:r>
             <a:endParaRPr lang="en-SG"/>
@@ -288,7 +304,7 @@
           <a:p>
             <a:fld id="{A8886CD7-4058-4E48-B9C4-9EA782D336AA}" type="datetimeFigureOut">
               <a:rPr lang="en-SG" smtClean="0"/>
-              <a:t>14/7/2017</a:t>
+              <a:t>18/9/25</a:t>
             </a:fld>
             <a:endParaRPr lang="en-SG"/>
           </a:p>
@@ -382,7 +398,7 @@
           <a:lstStyle/>
           <a:p>
             <a:r>
-              <a:rPr lang="en-US" smtClean="0"/>
+              <a:rPr lang="en-US"/>
               <a:t>Click to edit Master title style</a:t>
             </a:r>
             <a:endParaRPr lang="en-SG"/>
@@ -406,35 +422,35 @@
           <a:p>
             <a:pPr lvl="0"/>
             <a:r>
-              <a:rPr lang="en-US" smtClean="0"/>
+              <a:rPr lang="en-US"/>
               <a:t>Click to edit Master text styles</a:t>
             </a:r>
           </a:p>
           <a:p>
             <a:pPr lvl="1"/>
             <a:r>
-              <a:rPr lang="en-US" smtClean="0"/>
+              <a:rPr lang="en-US"/>
               <a:t>Second level</a:t>
             </a:r>
           </a:p>
           <a:p>
             <a:pPr lvl="2"/>
             <a:r>
-              <a:rPr lang="en-US" smtClean="0"/>
+              <a:rPr lang="en-US"/>
               <a:t>Third level</a:t>
             </a:r>
           </a:p>
           <a:p>
             <a:pPr lvl="3"/>
             <a:r>
-              <a:rPr lang="en-US" smtClean="0"/>
+              <a:rPr lang="en-US"/>
               <a:t>Fourth level</a:t>
             </a:r>
           </a:p>
           <a:p>
             <a:pPr lvl="4"/>
             <a:r>
-              <a:rPr lang="en-US" smtClean="0"/>
+              <a:rPr lang="en-US"/>
               <a:t>Fifth level</a:t>
             </a:r>
             <a:endParaRPr lang="en-SG"/>
@@ -458,7 +474,7 @@
           <a:p>
             <a:fld id="{A8886CD7-4058-4E48-B9C4-9EA782D336AA}" type="datetimeFigureOut">
               <a:rPr lang="en-SG" smtClean="0"/>
-              <a:t>14/7/2017</a:t>
+              <a:t>18/9/25</a:t>
             </a:fld>
             <a:endParaRPr lang="en-SG"/>
           </a:p>
@@ -557,7 +573,7 @@
           <a:lstStyle/>
           <a:p>
             <a:r>
-              <a:rPr lang="en-US" smtClean="0"/>
+              <a:rPr lang="en-US"/>
               <a:t>Click to edit Master title style</a:t>
             </a:r>
             <a:endParaRPr lang="en-SG"/>
@@ -586,35 +602,35 @@
           <a:p>
             <a:pPr lvl="0"/>
             <a:r>
-              <a:rPr lang="en-US" smtClean="0"/>
+              <a:rPr lang="en-US"/>
               <a:t>Click to edit Master text styles</a:t>
             </a:r>
           </a:p>
           <a:p>
             <a:pPr lvl="1"/>
             <a:r>
-              <a:rPr lang="en-US" smtClean="0"/>
+              <a:rPr lang="en-US"/>
               <a:t>Second level</a:t>
             </a:r>
           </a:p>
           <a:p>
             <a:pPr lvl="2"/>
             <a:r>
-              <a:rPr lang="en-US" smtClean="0"/>
+              <a:rPr lang="en-US"/>
               <a:t>Third level</a:t>
             </a:r>
           </a:p>
           <a:p>
             <a:pPr lvl="3"/>
             <a:r>
-              <a:rPr lang="en-US" smtClean="0"/>
+              <a:rPr lang="en-US"/>
               <a:t>Fourth level</a:t>
             </a:r>
           </a:p>
           <a:p>
             <a:pPr lvl="4"/>
             <a:r>
-              <a:rPr lang="en-US" smtClean="0"/>
+              <a:rPr lang="en-US"/>
               <a:t>Fifth level</a:t>
             </a:r>
             <a:endParaRPr lang="en-SG"/>
@@ -638,7 +654,7 @@
           <a:p>
             <a:fld id="{A8886CD7-4058-4E48-B9C4-9EA782D336AA}" type="datetimeFigureOut">
               <a:rPr lang="en-SG" smtClean="0"/>
-              <a:t>14/7/2017</a:t>
+              <a:t>18/9/25</a:t>
             </a:fld>
             <a:endParaRPr lang="en-SG"/>
           </a:p>
@@ -732,7 +748,7 @@
           <a:lstStyle/>
           <a:p>
             <a:r>
-              <a:rPr lang="en-US" smtClean="0"/>
+              <a:rPr lang="en-US"/>
               <a:t>Click to edit Master title style</a:t>
             </a:r>
             <a:endParaRPr lang="en-SG"/>
@@ -756,35 +772,35 @@
           <a:p>
             <a:pPr lvl="0"/>
             <a:r>
-              <a:rPr lang="en-US" smtClean="0"/>
+              <a:rPr lang="en-US"/>
               <a:t>Click to edit Master text styles</a:t>
             </a:r>
           </a:p>
           <a:p>
             <a:pPr lvl="1"/>
             <a:r>
-              <a:rPr lang="en-US" smtClean="0"/>
+              <a:rPr lang="en-US"/>
               <a:t>Second level</a:t>
             </a:r>
           </a:p>
           <a:p>
             <a:pPr lvl="2"/>
             <a:r>
-              <a:rPr lang="en-US" smtClean="0"/>
+              <a:rPr lang="en-US"/>
               <a:t>Third level</a:t>
             </a:r>
           </a:p>
           <a:p>
             <a:pPr lvl="3"/>
             <a:r>
-              <a:rPr lang="en-US" smtClean="0"/>
+              <a:rPr lang="en-US"/>
               <a:t>Fourth level</a:t>
             </a:r>
           </a:p>
           <a:p>
             <a:pPr lvl="4"/>
             <a:r>
-              <a:rPr lang="en-US" smtClean="0"/>
+              <a:rPr lang="en-US"/>
               <a:t>Fifth level</a:t>
             </a:r>
             <a:endParaRPr lang="en-SG"/>
@@ -808,7 +824,7 @@
           <a:p>
             <a:fld id="{A8886CD7-4058-4E48-B9C4-9EA782D336AA}" type="datetimeFigureOut">
               <a:rPr lang="en-SG" smtClean="0"/>
-              <a:t>14/7/2017</a:t>
+              <a:t>18/9/25</a:t>
             </a:fld>
             <a:endParaRPr lang="en-SG"/>
           </a:p>
@@ -911,7 +927,7 @@
           </a:lstStyle>
           <a:p>
             <a:r>
-              <a:rPr lang="en-US" smtClean="0"/>
+              <a:rPr lang="en-US"/>
               <a:t>Click to edit Master title style</a:t>
             </a:r>
             <a:endParaRPr lang="en-SG"/>
@@ -1031,7 +1047,7 @@
           <a:p>
             <a:pPr lvl="0"/>
             <a:r>
-              <a:rPr lang="en-US" smtClean="0"/>
+              <a:rPr lang="en-US"/>
               <a:t>Click to edit Master text styles</a:t>
             </a:r>
           </a:p>
@@ -1054,7 +1070,7 @@
           <a:p>
             <a:fld id="{A8886CD7-4058-4E48-B9C4-9EA782D336AA}" type="datetimeFigureOut">
               <a:rPr lang="en-SG" smtClean="0"/>
-              <a:t>14/7/2017</a:t>
+              <a:t>18/9/25</a:t>
             </a:fld>
             <a:endParaRPr lang="en-SG"/>
           </a:p>
@@ -1148,7 +1164,7 @@
           <a:lstStyle/>
           <a:p>
             <a:r>
-              <a:rPr lang="en-US" smtClean="0"/>
+              <a:rPr lang="en-US"/>
               <a:t>Click to edit Master title style</a:t>
             </a:r>
             <a:endParaRPr lang="en-SG"/>
@@ -1205,35 +1221,35 @@
           <a:p>
             <a:pPr lvl="0"/>
             <a:r>
-              <a:rPr lang="en-US" smtClean="0"/>
+              <a:rPr lang="en-US"/>
               <a:t>Click to edit Master text styles</a:t>
             </a:r>
           </a:p>
           <a:p>
             <a:pPr lvl="1"/>
             <a:r>
-              <a:rPr lang="en-US" smtClean="0"/>
+              <a:rPr lang="en-US"/>
               <a:t>Second level</a:t>
             </a:r>
           </a:p>
           <a:p>
             <a:pPr lvl="2"/>
             <a:r>
-              <a:rPr lang="en-US" smtClean="0"/>
+              <a:rPr lang="en-US"/>
               <a:t>Third level</a:t>
             </a:r>
           </a:p>
           <a:p>
             <a:pPr lvl="3"/>
             <a:r>
-              <a:rPr lang="en-US" smtClean="0"/>
+              <a:rPr lang="en-US"/>
               <a:t>Fourth level</a:t>
             </a:r>
           </a:p>
           <a:p>
             <a:pPr lvl="4"/>
             <a:r>
-              <a:rPr lang="en-US" smtClean="0"/>
+              <a:rPr lang="en-US"/>
               <a:t>Fifth level</a:t>
             </a:r>
             <a:endParaRPr lang="en-SG"/>
@@ -1290,35 +1306,35 @@
           <a:p>
             <a:pPr lvl="0"/>
             <a:r>
-              <a:rPr lang="en-US" smtClean="0"/>
+              <a:rPr lang="en-US"/>
               <a:t>Click to edit Master text styles</a:t>
             </a:r>
           </a:p>
           <a:p>
             <a:pPr lvl="1"/>
             <a:r>
-              <a:rPr lang="en-US" smtClean="0"/>
+              <a:rPr lang="en-US"/>
               <a:t>Second level</a:t>
             </a:r>
           </a:p>
           <a:p>
             <a:pPr lvl="2"/>
             <a:r>
-              <a:rPr lang="en-US" smtClean="0"/>
+              <a:rPr lang="en-US"/>
               <a:t>Third level</a:t>
             </a:r>
           </a:p>
           <a:p>
             <a:pPr lvl="3"/>
             <a:r>
-              <a:rPr lang="en-US" smtClean="0"/>
+              <a:rPr lang="en-US"/>
               <a:t>Fourth level</a:t>
             </a:r>
           </a:p>
           <a:p>
             <a:pPr lvl="4"/>
             <a:r>
-              <a:rPr lang="en-US" smtClean="0"/>
+              <a:rPr lang="en-US"/>
               <a:t>Fifth level</a:t>
             </a:r>
             <a:endParaRPr lang="en-SG"/>
@@ -1342,7 +1358,7 @@
           <a:p>
             <a:fld id="{A8886CD7-4058-4E48-B9C4-9EA782D336AA}" type="datetimeFigureOut">
               <a:rPr lang="en-SG" smtClean="0"/>
-              <a:t>14/7/2017</a:t>
+              <a:t>18/9/25</a:t>
             </a:fld>
             <a:endParaRPr lang="en-SG"/>
           </a:p>
@@ -1440,7 +1456,7 @@
           </a:lstStyle>
           <a:p>
             <a:r>
-              <a:rPr lang="en-US" smtClean="0"/>
+              <a:rPr lang="en-US"/>
               <a:t>Click to edit Master title style</a:t>
             </a:r>
             <a:endParaRPr lang="en-SG"/>
@@ -1506,7 +1522,7 @@
           <a:p>
             <a:pPr lvl="0"/>
             <a:r>
-              <a:rPr lang="en-US" smtClean="0"/>
+              <a:rPr lang="en-US"/>
               <a:t>Click to edit Master text styles</a:t>
             </a:r>
           </a:p>
@@ -1562,35 +1578,35 @@
           <a:p>
             <a:pPr lvl="0"/>
             <a:r>
-              <a:rPr lang="en-US" smtClean="0"/>
+              <a:rPr lang="en-US"/>
               <a:t>Click to edit Master text styles</a:t>
             </a:r>
           </a:p>
           <a:p>
             <a:pPr lvl="1"/>
             <a:r>
-              <a:rPr lang="en-US" smtClean="0"/>
+              <a:rPr lang="en-US"/>
               <a:t>Second level</a:t>
             </a:r>
           </a:p>
           <a:p>
             <a:pPr lvl="2"/>
             <a:r>
-              <a:rPr lang="en-US" smtClean="0"/>
+              <a:rPr lang="en-US"/>
               <a:t>Third level</a:t>
             </a:r>
           </a:p>
           <a:p>
             <a:pPr lvl="3"/>
             <a:r>
-              <a:rPr lang="en-US" smtClean="0"/>
+              <a:rPr lang="en-US"/>
               <a:t>Fourth level</a:t>
             </a:r>
           </a:p>
           <a:p>
             <a:pPr lvl="4"/>
             <a:r>
-              <a:rPr lang="en-US" smtClean="0"/>
+              <a:rPr lang="en-US"/>
               <a:t>Fifth level</a:t>
             </a:r>
             <a:endParaRPr lang="en-SG"/>
@@ -1656,7 +1672,7 @@
           <a:p>
             <a:pPr lvl="0"/>
             <a:r>
-              <a:rPr lang="en-US" smtClean="0"/>
+              <a:rPr lang="en-US"/>
               <a:t>Click to edit Master text styles</a:t>
             </a:r>
           </a:p>
@@ -1712,35 +1728,35 @@
           <a:p>
             <a:pPr lvl="0"/>
             <a:r>
-              <a:rPr lang="en-US" smtClean="0"/>
+              <a:rPr lang="en-US"/>
               <a:t>Click to edit Master text styles</a:t>
             </a:r>
           </a:p>
           <a:p>
             <a:pPr lvl="1"/>
             <a:r>
-              <a:rPr lang="en-US" smtClean="0"/>
+              <a:rPr lang="en-US"/>
               <a:t>Second level</a:t>
             </a:r>
           </a:p>
           <a:p>
             <a:pPr lvl="2"/>
             <a:r>
-              <a:rPr lang="en-US" smtClean="0"/>
+              <a:rPr lang="en-US"/>
               <a:t>Third level</a:t>
             </a:r>
           </a:p>
           <a:p>
             <a:pPr lvl="3"/>
             <a:r>
-              <a:rPr lang="en-US" smtClean="0"/>
+              <a:rPr lang="en-US"/>
               <a:t>Fourth level</a:t>
             </a:r>
           </a:p>
           <a:p>
             <a:pPr lvl="4"/>
             <a:r>
-              <a:rPr lang="en-US" smtClean="0"/>
+              <a:rPr lang="en-US"/>
               <a:t>Fifth level</a:t>
             </a:r>
             <a:endParaRPr lang="en-SG"/>
@@ -1764,7 +1780,7 @@
           <a:p>
             <a:fld id="{A8886CD7-4058-4E48-B9C4-9EA782D336AA}" type="datetimeFigureOut">
               <a:rPr lang="en-SG" smtClean="0"/>
-              <a:t>14/7/2017</a:t>
+              <a:t>18/9/25</a:t>
             </a:fld>
             <a:endParaRPr lang="en-SG"/>
           </a:p>
@@ -1858,7 +1874,7 @@
           <a:lstStyle/>
           <a:p>
             <a:r>
-              <a:rPr lang="en-US" smtClean="0"/>
+              <a:rPr lang="en-US"/>
               <a:t>Click to edit Master title style</a:t>
             </a:r>
             <a:endParaRPr lang="en-SG"/>
@@ -1882,7 +1898,7 @@
           <a:p>
             <a:fld id="{A8886CD7-4058-4E48-B9C4-9EA782D336AA}" type="datetimeFigureOut">
               <a:rPr lang="en-SG" smtClean="0"/>
-              <a:t>14/7/2017</a:t>
+              <a:t>18/9/25</a:t>
             </a:fld>
             <a:endParaRPr lang="en-SG"/>
           </a:p>
@@ -1977,7 +1993,7 @@
           <a:p>
             <a:fld id="{A8886CD7-4058-4E48-B9C4-9EA782D336AA}" type="datetimeFigureOut">
               <a:rPr lang="en-SG" smtClean="0"/>
-              <a:t>14/7/2017</a:t>
+              <a:t>18/9/25</a:t>
             </a:fld>
             <a:endParaRPr lang="en-SG"/>
           </a:p>
@@ -2080,7 +2096,7 @@
           </a:lstStyle>
           <a:p>
             <a:r>
-              <a:rPr lang="en-US" smtClean="0"/>
+              <a:rPr lang="en-US"/>
               <a:t>Click to edit Master title style</a:t>
             </a:r>
             <a:endParaRPr lang="en-SG"/>
@@ -2137,35 +2153,35 @@
           <a:p>
             <a:pPr lvl="0"/>
             <a:r>
-              <a:rPr lang="en-US" smtClean="0"/>
+              <a:rPr lang="en-US"/>
               <a:t>Click to edit Master text styles</a:t>
             </a:r>
           </a:p>
           <a:p>
             <a:pPr lvl="1"/>
             <a:r>
-              <a:rPr lang="en-US" smtClean="0"/>
+              <a:rPr lang="en-US"/>
               <a:t>Second level</a:t>
             </a:r>
           </a:p>
           <a:p>
             <a:pPr lvl="2"/>
             <a:r>
-              <a:rPr lang="en-US" smtClean="0"/>
+              <a:rPr lang="en-US"/>
               <a:t>Third level</a:t>
             </a:r>
           </a:p>
           <a:p>
             <a:pPr lvl="3"/>
             <a:r>
-              <a:rPr lang="en-US" smtClean="0"/>
+              <a:rPr lang="en-US"/>
               <a:t>Fourth level</a:t>
             </a:r>
           </a:p>
           <a:p>
             <a:pPr lvl="4"/>
             <a:r>
-              <a:rPr lang="en-US" smtClean="0"/>
+              <a:rPr lang="en-US"/>
               <a:t>Fifth level</a:t>
             </a:r>
             <a:endParaRPr lang="en-SG"/>
@@ -2231,7 +2247,7 @@
           <a:p>
             <a:pPr lvl="0"/>
             <a:r>
-              <a:rPr lang="en-US" smtClean="0"/>
+              <a:rPr lang="en-US"/>
               <a:t>Click to edit Master text styles</a:t>
             </a:r>
           </a:p>
@@ -2254,7 +2270,7 @@
           <a:p>
             <a:fld id="{A8886CD7-4058-4E48-B9C4-9EA782D336AA}" type="datetimeFigureOut">
               <a:rPr lang="en-SG" smtClean="0"/>
-              <a:t>14/7/2017</a:t>
+              <a:t>18/9/25</a:t>
             </a:fld>
             <a:endParaRPr lang="en-SG"/>
           </a:p>
@@ -2357,7 +2373,7 @@
           </a:lstStyle>
           <a:p>
             <a:r>
-              <a:rPr lang="en-US" smtClean="0"/>
+              <a:rPr lang="en-US"/>
               <a:t>Click to edit Master title style</a:t>
             </a:r>
             <a:endParaRPr lang="en-SG"/>
@@ -2484,7 +2500,7 @@
           <a:p>
             <a:pPr lvl="0"/>
             <a:r>
-              <a:rPr lang="en-US" smtClean="0"/>
+              <a:rPr lang="en-US"/>
               <a:t>Click to edit Master text styles</a:t>
             </a:r>
           </a:p>
@@ -2507,7 +2523,7 @@
           <a:p>
             <a:fld id="{A8886CD7-4058-4E48-B9C4-9EA782D336AA}" type="datetimeFigureOut">
               <a:rPr lang="en-SG" smtClean="0"/>
-              <a:t>14/7/2017</a:t>
+              <a:t>18/9/25</a:t>
             </a:fld>
             <a:endParaRPr lang="en-SG"/>
           </a:p>
@@ -2616,7 +2632,7 @@
           <a:lstStyle/>
           <a:p>
             <a:r>
-              <a:rPr lang="en-US" smtClean="0"/>
+              <a:rPr lang="en-US"/>
               <a:t>Click to edit Master title style</a:t>
             </a:r>
             <a:endParaRPr lang="en-SG"/>
@@ -2650,35 +2666,35 @@
           <a:p>
             <a:pPr lvl="0"/>
             <a:r>
-              <a:rPr lang="en-US" smtClean="0"/>
+              <a:rPr lang="en-US"/>
               <a:t>Click to edit Master text styles</a:t>
             </a:r>
           </a:p>
           <a:p>
             <a:pPr lvl="1"/>
             <a:r>
-              <a:rPr lang="en-US" smtClean="0"/>
+              <a:rPr lang="en-US"/>
               <a:t>Second level</a:t>
             </a:r>
           </a:p>
           <a:p>
             <a:pPr lvl="2"/>
             <a:r>
-              <a:rPr lang="en-US" smtClean="0"/>
+              <a:rPr lang="en-US"/>
               <a:t>Third level</a:t>
             </a:r>
           </a:p>
           <a:p>
             <a:pPr lvl="3"/>
             <a:r>
-              <a:rPr lang="en-US" smtClean="0"/>
+              <a:rPr lang="en-US"/>
               <a:t>Fourth level</a:t>
             </a:r>
           </a:p>
           <a:p>
             <a:pPr lvl="4"/>
             <a:r>
-              <a:rPr lang="en-US" smtClean="0"/>
+              <a:rPr lang="en-US"/>
               <a:t>Fifth level</a:t>
             </a:r>
             <a:endParaRPr lang="en-SG"/>
@@ -2720,7 +2736,7 @@
           <a:p>
             <a:fld id="{A8886CD7-4058-4E48-B9C4-9EA782D336AA}" type="datetimeFigureOut">
               <a:rPr lang="en-SG" smtClean="0"/>
-              <a:t>14/7/2017</a:t>
+              <a:t>18/9/25</a:t>
             </a:fld>
             <a:endParaRPr lang="en-SG"/>
           </a:p>
@@ -3103,8 +3119,8 @@
         </p:nvSpPr>
         <p:spPr>
           <a:xfrm>
-            <a:off x="1606140" y="2234893"/>
-            <a:ext cx="2629429" cy="1768319"/>
+            <a:off x="1595344" y="2709107"/>
+            <a:ext cx="2364871" cy="1768319"/>
           </a:xfrm>
           <a:prstGeom prst="roundRect">
             <a:avLst/>
@@ -3152,8 +3168,8 @@
         </p:nvSpPr>
         <p:spPr>
           <a:xfrm>
-            <a:off x="1632857" y="4114800"/>
-            <a:ext cx="2629429" cy="1768319"/>
+            <a:off x="1579423" y="4709917"/>
+            <a:ext cx="2364871" cy="1768319"/>
           </a:xfrm>
           <a:prstGeom prst="roundRect">
             <a:avLst/>
@@ -3202,7 +3218,7 @@
         <p:spPr>
           <a:xfrm>
             <a:off x="1579423" y="365281"/>
-            <a:ext cx="2629429" cy="1768319"/>
+            <a:ext cx="2364871" cy="1768319"/>
           </a:xfrm>
           <a:prstGeom prst="roundRect">
             <a:avLst/>
@@ -3250,8 +3266,8 @@
         </p:nvSpPr>
         <p:spPr>
           <a:xfrm>
-            <a:off x="5410200" y="228600"/>
-            <a:ext cx="2209800" cy="6096000"/>
+            <a:off x="4898452" y="365281"/>
+            <a:ext cx="4138044" cy="6096000"/>
           </a:xfrm>
           <a:prstGeom prst="roundRect">
             <a:avLst/>
@@ -3288,18 +3304,13 @@
           <a:p>
             <a:pPr algn="ctr"/>
             <a:r>
-              <a:rPr lang="en-US" dirty="0" smtClean="0">
+              <a:rPr lang="en-US" dirty="0">
                 <a:solidFill>
                   <a:schemeClr val="accent5"/>
                 </a:solidFill>
               </a:rPr>
               <a:t>GitHub</a:t>
             </a:r>
-            <a:endParaRPr lang="en-US" dirty="0">
-              <a:solidFill>
-                <a:schemeClr val="accent5"/>
-              </a:solidFill>
-            </a:endParaRPr>
           </a:p>
         </p:txBody>
       </p:sp>
@@ -3311,7 +3322,7 @@
         </p:nvSpPr>
         <p:spPr>
           <a:xfrm>
-            <a:off x="1981200" y="2943461"/>
+            <a:off x="1970404" y="3417675"/>
             <a:ext cx="887317" cy="944563"/>
           </a:xfrm>
           <a:prstGeom prst="rect">
@@ -3377,7 +3388,7 @@
         </p:nvSpPr>
         <p:spPr>
           <a:xfrm>
-            <a:off x="1981200" y="4846637"/>
+            <a:off x="1927766" y="5441754"/>
             <a:ext cx="887317" cy="944563"/>
           </a:xfrm>
           <a:prstGeom prst="rect">
@@ -3443,7 +3454,7 @@
         </p:nvSpPr>
         <p:spPr>
           <a:xfrm>
-            <a:off x="618133" y="2459835"/>
+            <a:off x="607337" y="2934049"/>
             <a:ext cx="577005" cy="559168"/>
           </a:xfrm>
           <a:prstGeom prst="smileyFace">
@@ -3481,7 +3492,7 @@
         </p:nvSpPr>
         <p:spPr>
           <a:xfrm>
-            <a:off x="2330190" y="2310032"/>
+            <a:off x="2319394" y="2784246"/>
             <a:ext cx="1186542" cy="890797"/>
           </a:xfrm>
           <a:prstGeom prst="can">
@@ -3508,7 +3519,7 @@
           <a:p>
             <a:pPr algn="ctr"/>
             <a:r>
-              <a:rPr lang="en-US" dirty="0" smtClean="0"/>
+              <a:rPr lang="en-US" dirty="0"/>
               <a:t>Ravi’s Local Repo</a:t>
             </a:r>
           </a:p>
@@ -3522,7 +3533,7 @@
         </p:nvSpPr>
         <p:spPr>
           <a:xfrm>
-            <a:off x="618133" y="4406716"/>
+            <a:off x="564699" y="5001833"/>
             <a:ext cx="577005" cy="559168"/>
           </a:xfrm>
           <a:prstGeom prst="smileyFace">
@@ -3560,7 +3571,7 @@
         </p:nvSpPr>
         <p:spPr>
           <a:xfrm>
-            <a:off x="2406390" y="4240870"/>
+            <a:off x="2352956" y="4835987"/>
             <a:ext cx="1186542" cy="890797"/>
           </a:xfrm>
           <a:prstGeom prst="can">
@@ -3587,7 +3598,7 @@
           <a:p>
             <a:pPr algn="ctr"/>
             <a:r>
-              <a:rPr lang="en-US" dirty="0" smtClean="0"/>
+              <a:rPr lang="en-US" dirty="0"/>
               <a:t>Adam’s Local Repo</a:t>
             </a:r>
           </a:p>
@@ -3604,7 +3615,7 @@
         </p:nvCxnSpPr>
         <p:spPr>
           <a:xfrm>
-            <a:off x="1195138" y="2739419"/>
+            <a:off x="1184342" y="3213633"/>
             <a:ext cx="1135052" cy="16012"/>
           </a:xfrm>
           <a:prstGeom prst="straightConnector1">
@@ -3633,13 +3644,15 @@
       <p:cxnSp>
         <p:nvCxnSpPr>
           <p:cNvPr id="47" name="Straight Arrow Connector 46"/>
-          <p:cNvCxnSpPr/>
+          <p:cNvCxnSpPr>
+            <a:cxnSpLocks/>
+          </p:cNvCxnSpPr>
           <p:nvPr/>
         </p:nvCxnSpPr>
         <p:spPr>
           <a:xfrm flipV="1">
-            <a:off x="3731856" y="3968703"/>
-            <a:ext cx="1912710" cy="687822"/>
+            <a:off x="3678422" y="5232354"/>
+            <a:ext cx="1449917" cy="19288"/>
           </a:xfrm>
           <a:prstGeom prst="straightConnector1">
             <a:avLst/>
@@ -3678,7 +3691,7 @@
         </p:nvCxnSpPr>
         <p:spPr>
           <a:xfrm flipV="1">
-            <a:off x="1195138" y="4686269"/>
+            <a:off x="1141704" y="5281386"/>
             <a:ext cx="1211252" cy="31"/>
           </a:xfrm>
           <a:prstGeom prst="straightConnector1">
@@ -3715,12 +3728,15 @@
         </p:nvSpPr>
         <p:spPr>
           <a:xfrm>
-            <a:off x="5722577" y="4802424"/>
+            <a:off x="7124521" y="2664744"/>
             <a:ext cx="1251210" cy="931050"/>
           </a:xfrm>
           <a:prstGeom prst="can">
             <a:avLst/>
           </a:prstGeom>
+          <a:solidFill>
+            <a:srgbClr val="C00000"/>
+          </a:solidFill>
         </p:spPr>
         <p:style>
           <a:lnRef idx="3">
@@ -3742,7 +3758,7 @@
           <a:p>
             <a:pPr algn="ctr"/>
             <a:r>
-              <a:rPr lang="en-US" dirty="0" smtClean="0"/>
+              <a:rPr lang="en-US" dirty="0"/>
               <a:t>Main Repo</a:t>
             </a:r>
           </a:p>
@@ -3752,15 +3768,15 @@
         <p:nvCxnSpPr>
           <p:cNvPr id="50" name="Straight Arrow Connector 49"/>
           <p:cNvCxnSpPr>
-            <a:stCxn id="43" idx="4"/>
+            <a:cxnSpLocks/>
             <a:endCxn id="59" idx="2"/>
           </p:cNvCxnSpPr>
           <p:nvPr/>
         </p:nvCxnSpPr>
         <p:spPr>
-          <a:xfrm flipV="1">
-            <a:off x="3516732" y="2356407"/>
-            <a:ext cx="2233596" cy="399024"/>
+          <a:xfrm>
+            <a:off x="3568645" y="3437730"/>
+            <a:ext cx="1656989" cy="71207"/>
           </a:xfrm>
           <a:prstGeom prst="straightConnector1">
             <a:avLst/>
@@ -3868,6 +3884,11 @@
           <a:prstGeom prst="smileyFace">
             <a:avLst/>
           </a:prstGeom>
+          <a:solidFill>
+            <a:schemeClr val="accent6">
+              <a:lumMod val="75000"/>
+            </a:schemeClr>
+          </a:solidFill>
         </p:spPr>
         <p:style>
           <a:lnRef idx="3">
@@ -3906,6 +3927,11 @@
           <a:prstGeom prst="can">
             <a:avLst/>
           </a:prstGeom>
+          <a:solidFill>
+            <a:schemeClr val="accent6">
+              <a:lumMod val="75000"/>
+            </a:schemeClr>
+          </a:solidFill>
         </p:spPr>
         <p:style>
           <a:lnRef idx="3">
@@ -3927,7 +3953,7 @@
           <a:p>
             <a:pPr algn="ctr"/>
             <a:r>
-              <a:rPr lang="en-US" dirty="0" smtClean="0"/>
+              <a:rPr lang="en-US" dirty="0"/>
               <a:t>Jean’s Local Repo</a:t>
             </a:r>
           </a:p>
@@ -3977,15 +4003,14 @@
         <p:nvCxnSpPr>
           <p:cNvPr id="55" name="Straight Arrow Connector 54"/>
           <p:cNvCxnSpPr>
-            <a:stCxn id="53" idx="4"/>
-            <a:endCxn id="61" idx="2"/>
+            <a:cxnSpLocks/>
           </p:cNvCxnSpPr>
           <p:nvPr/>
         </p:nvCxnSpPr>
         <p:spPr>
           <a:xfrm>
-            <a:off x="3455565" y="873106"/>
-            <a:ext cx="2281817" cy="0"/>
+            <a:off x="3579209" y="807563"/>
+            <a:ext cx="1684328" cy="607196"/>
           </a:xfrm>
           <a:prstGeom prst="straightConnector1">
             <a:avLst/>
@@ -4021,7 +4046,7 @@
         </p:nvSpPr>
         <p:spPr>
           <a:xfrm>
-            <a:off x="572223" y="4964668"/>
+            <a:off x="518789" y="5559785"/>
             <a:ext cx="845511" cy="369332"/>
           </a:xfrm>
           <a:prstGeom prst="rect">
@@ -4036,7 +4061,7 @@
           <a:lstStyle/>
           <a:p>
             <a:r>
-              <a:rPr lang="en-US" dirty="0" smtClean="0"/>
+              <a:rPr lang="en-US" dirty="0"/>
               <a:t>Adam</a:t>
             </a:r>
             <a:endParaRPr lang="en-SG" dirty="0"/>
@@ -4051,7 +4076,7 @@
         </p:nvSpPr>
         <p:spPr>
           <a:xfrm>
-            <a:off x="572223" y="3039655"/>
+            <a:off x="561427" y="3513869"/>
             <a:ext cx="668823" cy="381000"/>
           </a:xfrm>
           <a:prstGeom prst="rect">
@@ -4066,7 +4091,7 @@
           <a:lstStyle/>
           <a:p>
             <a:r>
-              <a:rPr lang="en-US" dirty="0" smtClean="0"/>
+              <a:rPr lang="en-US" dirty="0"/>
               <a:t>Ravi</a:t>
             </a:r>
             <a:endParaRPr lang="en-SG" dirty="0"/>
@@ -4096,7 +4121,7 @@
           <a:lstStyle/>
           <a:p>
             <a:r>
-              <a:rPr lang="en-US" dirty="0" smtClean="0"/>
+              <a:rPr lang="en-US" dirty="0"/>
               <a:t>Jean</a:t>
             </a:r>
             <a:endParaRPr lang="en-SG" dirty="0"/>
@@ -4111,7 +4136,7 @@
         </p:nvSpPr>
         <p:spPr>
           <a:xfrm>
-            <a:off x="5750328" y="1911008"/>
+            <a:off x="5225634" y="3063538"/>
             <a:ext cx="1186542" cy="890797"/>
           </a:xfrm>
           <a:prstGeom prst="can">
@@ -4138,7 +4163,7 @@
           <a:p>
             <a:pPr algn="ctr"/>
             <a:r>
-              <a:rPr lang="en-US" dirty="0" smtClean="0"/>
+              <a:rPr lang="en-US" dirty="0"/>
               <a:t>Ravi’s Fork</a:t>
             </a:r>
           </a:p>
@@ -4152,7 +4177,7 @@
         </p:nvSpPr>
         <p:spPr>
           <a:xfrm>
-            <a:off x="5750328" y="3338327"/>
+            <a:off x="5185146" y="4835202"/>
             <a:ext cx="1186542" cy="890797"/>
           </a:xfrm>
           <a:prstGeom prst="can">
@@ -4179,7 +4204,7 @@
           <a:p>
             <a:pPr algn="ctr"/>
             <a:r>
-              <a:rPr lang="en-US" dirty="0" smtClean="0"/>
+              <a:rPr lang="en-US" dirty="0"/>
               <a:t>Adam’s Fork</a:t>
             </a:r>
           </a:p>
@@ -4193,12 +4218,17 @@
         </p:nvSpPr>
         <p:spPr>
           <a:xfrm>
-            <a:off x="5737382" y="427707"/>
+            <a:off x="5225634" y="1136678"/>
             <a:ext cx="1186542" cy="890797"/>
           </a:xfrm>
           <a:prstGeom prst="can">
             <a:avLst/>
           </a:prstGeom>
+          <a:solidFill>
+            <a:schemeClr val="accent6">
+              <a:lumMod val="75000"/>
+            </a:schemeClr>
+          </a:solidFill>
         </p:spPr>
         <p:style>
           <a:lnRef idx="3">
@@ -4220,7 +4250,7 @@
           <a:p>
             <a:pPr algn="ctr"/>
             <a:r>
-              <a:rPr lang="en-US" dirty="0" smtClean="0"/>
+              <a:rPr lang="en-US" dirty="0"/>
               <a:t>Jean’s Fork</a:t>
             </a:r>
           </a:p>
@@ -4230,14 +4260,14 @@
         <p:nvCxnSpPr>
           <p:cNvPr id="62" name="Straight Arrow Connector 61"/>
           <p:cNvCxnSpPr>
-            <a:endCxn id="49" idx="2"/>
+            <a:cxnSpLocks/>
           </p:cNvCxnSpPr>
           <p:nvPr/>
         </p:nvCxnSpPr>
         <p:spPr>
-          <a:xfrm>
-            <a:off x="3516732" y="2871586"/>
-            <a:ext cx="2205845" cy="2396363"/>
+          <a:xfrm flipH="1">
+            <a:off x="6450983" y="3317703"/>
+            <a:ext cx="673538" cy="120027"/>
           </a:xfrm>
           <a:prstGeom prst="straightConnector1">
             <a:avLst/>
@@ -4270,14 +4300,14 @@
         <p:nvCxnSpPr>
           <p:cNvPr id="63" name="Straight Arrow Connector 62"/>
           <p:cNvCxnSpPr>
-            <a:endCxn id="49" idx="2"/>
+            <a:cxnSpLocks/>
           </p:cNvCxnSpPr>
           <p:nvPr/>
         </p:nvCxnSpPr>
         <p:spPr>
-          <a:xfrm>
-            <a:off x="3488981" y="1058160"/>
-            <a:ext cx="2233596" cy="4209789"/>
+          <a:xfrm flipH="1" flipV="1">
+            <a:off x="6309349" y="2061386"/>
+            <a:ext cx="938148" cy="632247"/>
           </a:xfrm>
           <a:prstGeom prst="straightConnector1">
             <a:avLst/>
@@ -4310,14 +4340,14 @@
         <p:nvCxnSpPr>
           <p:cNvPr id="64" name="Straight Arrow Connector 63"/>
           <p:cNvCxnSpPr>
-            <a:endCxn id="49" idx="2"/>
+            <a:cxnSpLocks/>
           </p:cNvCxnSpPr>
           <p:nvPr/>
         </p:nvCxnSpPr>
         <p:spPr>
-          <a:xfrm>
-            <a:off x="3693241" y="4822605"/>
-            <a:ext cx="2029336" cy="445344"/>
+          <a:xfrm flipH="1">
+            <a:off x="6412176" y="3680481"/>
+            <a:ext cx="712345" cy="1154721"/>
           </a:xfrm>
           <a:prstGeom prst="straightConnector1">
             <a:avLst/>
@@ -4346,30 +4376,314 @@
           </a:fontRef>
         </p:style>
       </p:cxnSp>
-      <p:cxnSp>
-        <p:nvCxnSpPr>
-          <p:cNvPr id="65" name="Elbow Connector 64"/>
-          <p:cNvCxnSpPr>
-            <a:stCxn id="61" idx="4"/>
-            <a:endCxn id="49" idx="4"/>
-          </p:cNvCxnSpPr>
+      <p:sp>
+        <p:nvSpPr>
+          <p:cNvPr id="32" name="TextBox 31">
+            <a:extLst>
+              <a:ext uri="{FF2B5EF4-FFF2-40B4-BE49-F238E27FC236}">
+                <a16:creationId xmlns:a16="http://schemas.microsoft.com/office/drawing/2014/main" id="{569128F5-2B22-AEBC-6872-2B0F8E96E0E2}"/>
+              </a:ext>
+            </a:extLst>
+          </p:cNvPr>
+          <p:cNvSpPr txBox="1"/>
           <p:nvPr/>
-        </p:nvCxnSpPr>
+        </p:nvSpPr>
+        <p:spPr>
+          <a:xfrm rot="1181408">
+            <a:off x="4090142" y="375125"/>
+            <a:ext cx="963716" cy="646331"/>
+          </a:xfrm>
+          <a:prstGeom prst="rect">
+            <a:avLst/>
+          </a:prstGeom>
+          <a:noFill/>
+        </p:spPr>
+        <p:txBody>
+          <a:bodyPr wrap="square" rtlCol="0">
+            <a:spAutoFit/>
+          </a:bodyPr>
+          <a:lstStyle/>
+          <a:p>
+            <a:r>
+              <a:rPr lang="en-US" dirty="0">
+                <a:solidFill>
+                  <a:schemeClr val="accent6">
+                    <a:lumMod val="75000"/>
+                  </a:schemeClr>
+                </a:solidFill>
+              </a:rPr>
+              <a:t>1. push branch</a:t>
+            </a:r>
+            <a:endParaRPr lang="en-SG" dirty="0">
+              <a:solidFill>
+                <a:schemeClr val="accent6">
+                  <a:lumMod val="75000"/>
+                </a:schemeClr>
+              </a:solidFill>
+            </a:endParaRPr>
+          </a:p>
+        </p:txBody>
+      </p:sp>
+      <p:sp>
+        <p:nvSpPr>
+          <p:cNvPr id="33" name="TextBox 32">
+            <a:extLst>
+              <a:ext uri="{FF2B5EF4-FFF2-40B4-BE49-F238E27FC236}">
+                <a16:creationId xmlns:a16="http://schemas.microsoft.com/office/drawing/2014/main" id="{6A43AEAF-F010-9AB7-D77A-004685CFAD44}"/>
+              </a:ext>
+            </a:extLst>
+          </p:cNvPr>
+          <p:cNvSpPr txBox="1"/>
+          <p:nvPr/>
+        </p:nvSpPr>
+        <p:spPr>
+          <a:xfrm rot="1923471">
+            <a:off x="6518841" y="1742677"/>
+            <a:ext cx="1168500" cy="646331"/>
+          </a:xfrm>
+          <a:prstGeom prst="rect">
+            <a:avLst/>
+          </a:prstGeom>
+          <a:noFill/>
+        </p:spPr>
+        <p:txBody>
+          <a:bodyPr wrap="square" rtlCol="0">
+            <a:spAutoFit/>
+          </a:bodyPr>
+          <a:lstStyle/>
+          <a:p>
+            <a:r>
+              <a:rPr lang="en-US" dirty="0">
+                <a:solidFill>
+                  <a:schemeClr val="accent6">
+                    <a:lumMod val="75000"/>
+                  </a:schemeClr>
+                </a:solidFill>
+              </a:rPr>
+              <a:t>2. PR from branch</a:t>
+            </a:r>
+            <a:endParaRPr lang="en-SG" dirty="0">
+              <a:solidFill>
+                <a:schemeClr val="accent6">
+                  <a:lumMod val="75000"/>
+                </a:schemeClr>
+              </a:solidFill>
+            </a:endParaRPr>
+          </a:p>
+        </p:txBody>
+      </p:sp>
+      <p:sp>
+        <p:nvSpPr>
+          <p:cNvPr id="34" name="Freeform 33">
+            <a:extLst>
+              <a:ext uri="{FF2B5EF4-FFF2-40B4-BE49-F238E27FC236}">
+                <a16:creationId xmlns:a16="http://schemas.microsoft.com/office/drawing/2014/main" id="{C235F23E-63C0-C708-F9B9-D5A272F3D0A1}"/>
+              </a:ext>
+            </a:extLst>
+          </p:cNvPr>
+          <p:cNvSpPr/>
+          <p:nvPr/>
+        </p:nvSpPr>
         <p:spPr>
           <a:xfrm>
-            <a:off x="6923924" y="873106"/>
-            <a:ext cx="49863" cy="4394843"/>
-          </a:xfrm>
-          <a:prstGeom prst="bentConnector3">
-            <a:avLst>
-              <a:gd name="adj1" fmla="val 991443"/>
-            </a:avLst>
-          </a:prstGeom>
+            <a:off x="3558448" y="1311007"/>
+            <a:ext cx="3503364" cy="1509311"/>
+          </a:xfrm>
+          <a:custGeom>
+            <a:avLst/>
+            <a:gdLst>
+              <a:gd name="connsiteX0" fmla="*/ 3503364 w 3503364"/>
+              <a:gd name="connsiteY0" fmla="*/ 1509311 h 1509311"/>
+              <a:gd name="connsiteX1" fmla="*/ 1575412 w 3503364"/>
+              <a:gd name="connsiteY1" fmla="*/ 881350 h 1509311"/>
+              <a:gd name="connsiteX2" fmla="*/ 0 w 3503364"/>
+              <a:gd name="connsiteY2" fmla="*/ 0 h 1509311"/>
+            </a:gdLst>
+            <a:ahLst/>
+            <a:cxnLst>
+              <a:cxn ang="0">
+                <a:pos x="connsiteX0" y="connsiteY0"/>
+              </a:cxn>
+              <a:cxn ang="0">
+                <a:pos x="connsiteX1" y="connsiteY1"/>
+              </a:cxn>
+              <a:cxn ang="0">
+                <a:pos x="connsiteX2" y="connsiteY2"/>
+              </a:cxn>
+            </a:cxnLst>
+            <a:rect l="l" t="t" r="r" b="b"/>
+            <a:pathLst>
+              <a:path w="3503364" h="1509311">
+                <a:moveTo>
+                  <a:pt x="3503364" y="1509311"/>
+                </a:moveTo>
+                <a:lnTo>
+                  <a:pt x="1575412" y="881350"/>
+                </a:lnTo>
+                <a:lnTo>
+                  <a:pt x="0" y="0"/>
+                </a:lnTo>
+              </a:path>
+            </a:pathLst>
+          </a:custGeom>
+          <a:noFill/>
           <a:ln>
             <a:solidFill>
-              <a:schemeClr val="accent2"/>
+              <a:schemeClr val="accent6">
+                <a:lumMod val="75000"/>
+              </a:schemeClr>
             </a:solidFill>
             <a:prstDash val="dash"/>
+            <a:headEnd type="none" w="med" len="med"/>
+            <a:tailEnd type="arrow" w="med" len="med"/>
+          </a:ln>
+        </p:spPr>
+        <p:style>
+          <a:lnRef idx="2">
+            <a:schemeClr val="accent1">
+              <a:shade val="15000"/>
+            </a:schemeClr>
+          </a:lnRef>
+          <a:fillRef idx="1">
+            <a:schemeClr val="accent1"/>
+          </a:fillRef>
+          <a:effectRef idx="0">
+            <a:schemeClr val="accent1"/>
+          </a:effectRef>
+          <a:fontRef idx="minor">
+            <a:schemeClr val="lt1"/>
+          </a:fontRef>
+        </p:style>
+        <p:txBody>
+          <a:bodyPr rtlCol="0" anchor="ctr"/>
+          <a:lstStyle/>
+          <a:p>
+            <a:pPr algn="ctr"/>
+            <a:endParaRPr lang="en-US"/>
+          </a:p>
+        </p:txBody>
+      </p:sp>
+      <p:sp>
+        <p:nvSpPr>
+          <p:cNvPr id="68" name="TextBox 67">
+            <a:extLst>
+              <a:ext uri="{FF2B5EF4-FFF2-40B4-BE49-F238E27FC236}">
+                <a16:creationId xmlns:a16="http://schemas.microsoft.com/office/drawing/2014/main" id="{2BA9BC2D-0343-8E86-45C5-BA6873640761}"/>
+              </a:ext>
+            </a:extLst>
+          </p:cNvPr>
+          <p:cNvSpPr txBox="1"/>
+          <p:nvPr/>
+        </p:nvSpPr>
+        <p:spPr>
+          <a:xfrm rot="1548550">
+            <a:off x="3778848" y="1901469"/>
+            <a:ext cx="1528966" cy="646331"/>
+          </a:xfrm>
+          <a:prstGeom prst="rect">
+            <a:avLst/>
+          </a:prstGeom>
+          <a:noFill/>
+        </p:spPr>
+        <p:txBody>
+          <a:bodyPr wrap="square" rtlCol="0">
+            <a:spAutoFit/>
+          </a:bodyPr>
+          <a:lstStyle/>
+          <a:p>
+            <a:r>
+              <a:rPr lang="en-US" dirty="0">
+                <a:solidFill>
+                  <a:schemeClr val="accent6">
+                    <a:lumMod val="75000"/>
+                  </a:schemeClr>
+                </a:solidFill>
+              </a:rPr>
+              <a:t>4. pull merged code</a:t>
+            </a:r>
+            <a:endParaRPr lang="en-SG" dirty="0">
+              <a:solidFill>
+                <a:schemeClr val="accent6">
+                  <a:lumMod val="75000"/>
+                </a:schemeClr>
+              </a:solidFill>
+            </a:endParaRPr>
+          </a:p>
+        </p:txBody>
+      </p:sp>
+      <p:sp>
+        <p:nvSpPr>
+          <p:cNvPr id="71" name="Freeform 70">
+            <a:extLst>
+              <a:ext uri="{FF2B5EF4-FFF2-40B4-BE49-F238E27FC236}">
+                <a16:creationId xmlns:a16="http://schemas.microsoft.com/office/drawing/2014/main" id="{FBA97518-AFBF-33BF-F900-55086445C6A3}"/>
+              </a:ext>
+            </a:extLst>
+          </p:cNvPr>
+          <p:cNvSpPr/>
+          <p:nvPr/>
+        </p:nvSpPr>
+        <p:spPr>
+          <a:xfrm rot="21010302">
+            <a:off x="7999001" y="2350301"/>
+            <a:ext cx="791195" cy="495274"/>
+          </a:xfrm>
+          <a:custGeom>
+            <a:avLst/>
+            <a:gdLst>
+              <a:gd name="connsiteX0" fmla="*/ 0 w 791195"/>
+              <a:gd name="connsiteY0" fmla="*/ 166432 h 495274"/>
+              <a:gd name="connsiteX1" fmla="*/ 705080 w 791195"/>
+              <a:gd name="connsiteY1" fmla="*/ 12196 h 495274"/>
+              <a:gd name="connsiteX2" fmla="*/ 749147 w 791195"/>
+              <a:gd name="connsiteY2" fmla="*/ 452870 h 495274"/>
+              <a:gd name="connsiteX3" fmla="*/ 429658 w 791195"/>
+              <a:gd name="connsiteY3" fmla="*/ 452870 h 495274"/>
+            </a:gdLst>
+            <a:ahLst/>
+            <a:cxnLst>
+              <a:cxn ang="0">
+                <a:pos x="connsiteX0" y="connsiteY0"/>
+              </a:cxn>
+              <a:cxn ang="0">
+                <a:pos x="connsiteX1" y="connsiteY1"/>
+              </a:cxn>
+              <a:cxn ang="0">
+                <a:pos x="connsiteX2" y="connsiteY2"/>
+              </a:cxn>
+              <a:cxn ang="0">
+                <a:pos x="connsiteX3" y="connsiteY3"/>
+              </a:cxn>
+            </a:cxnLst>
+            <a:rect l="l" t="t" r="r" b="b"/>
+            <a:pathLst>
+              <a:path w="791195" h="495274">
+                <a:moveTo>
+                  <a:pt x="0" y="166432"/>
+                </a:moveTo>
+                <a:cubicBezTo>
+                  <a:pt x="290111" y="65444"/>
+                  <a:pt x="580222" y="-35544"/>
+                  <a:pt x="705080" y="12196"/>
+                </a:cubicBezTo>
+                <a:cubicBezTo>
+                  <a:pt x="829938" y="59936"/>
+                  <a:pt x="795051" y="379424"/>
+                  <a:pt x="749147" y="452870"/>
+                </a:cubicBezTo>
+                <a:cubicBezTo>
+                  <a:pt x="703243" y="526316"/>
+                  <a:pt x="566450" y="489593"/>
+                  <a:pt x="429658" y="452870"/>
+                </a:cubicBezTo>
+              </a:path>
+            </a:pathLst>
+          </a:custGeom>
+          <a:ln>
+            <a:solidFill>
+              <a:srgbClr val="C00000"/>
+            </a:solidFill>
+            <a:prstDash val="sysDot"/>
             <a:headEnd type="none" w="med" len="med"/>
             <a:tailEnd type="arrow" w="med" len="med"/>
           </a:ln>
@@ -4388,29 +4702,119 @@
             <a:schemeClr val="tx1"/>
           </a:fontRef>
         </p:style>
-      </p:cxnSp>
-      <p:cxnSp>
-        <p:nvCxnSpPr>
-          <p:cNvPr id="66" name="Elbow Connector 65"/>
-          <p:cNvCxnSpPr>
-            <a:stCxn id="59" idx="4"/>
-            <a:endCxn id="49" idx="4"/>
-          </p:cNvCxnSpPr>
+        <p:txBody>
+          <a:bodyPr rtlCol="0" anchor="ctr"/>
+          <a:lstStyle/>
+          <a:p>
+            <a:pPr algn="ctr"/>
+            <a:endParaRPr lang="en-US"/>
+          </a:p>
+        </p:txBody>
+      </p:sp>
+      <p:sp>
+        <p:nvSpPr>
+          <p:cNvPr id="72" name="TextBox 71">
+            <a:extLst>
+              <a:ext uri="{FF2B5EF4-FFF2-40B4-BE49-F238E27FC236}">
+                <a16:creationId xmlns:a16="http://schemas.microsoft.com/office/drawing/2014/main" id="{C561F32D-3506-C7F1-8F57-F48C13DE7413}"/>
+              </a:ext>
+            </a:extLst>
+          </p:cNvPr>
+          <p:cNvSpPr txBox="1"/>
           <p:nvPr/>
-        </p:nvCxnSpPr>
+        </p:nvSpPr>
         <p:spPr>
           <a:xfrm>
-            <a:off x="6936870" y="2356407"/>
-            <a:ext cx="36917" cy="2911542"/>
-          </a:xfrm>
-          <a:prstGeom prst="bentConnector3">
-            <a:avLst>
-              <a:gd name="adj1" fmla="val 994439"/>
-            </a:avLst>
+            <a:off x="8003385" y="1704309"/>
+            <a:ext cx="1057338" cy="646331"/>
+          </a:xfrm>
+          <a:prstGeom prst="rect">
+            <a:avLst/>
           </a:prstGeom>
+          <a:noFill/>
+        </p:spPr>
+        <p:txBody>
+          <a:bodyPr wrap="square" rtlCol="0">
+            <a:spAutoFit/>
+          </a:bodyPr>
+          <a:lstStyle/>
+          <a:p>
+            <a:r>
+              <a:rPr lang="en-US" dirty="0">
+                <a:solidFill>
+                  <a:srgbClr val="C00000"/>
+                </a:solidFill>
+              </a:rPr>
+              <a:t>3. merge PR</a:t>
+            </a:r>
+            <a:endParaRPr lang="en-SG" dirty="0">
+              <a:solidFill>
+                <a:srgbClr val="C00000"/>
+              </a:solidFill>
+            </a:endParaRPr>
+          </a:p>
+        </p:txBody>
+      </p:sp>
+      <p:sp>
+        <p:nvSpPr>
+          <p:cNvPr id="74" name="Freeform 73">
+            <a:extLst>
+              <a:ext uri="{FF2B5EF4-FFF2-40B4-BE49-F238E27FC236}">
+                <a16:creationId xmlns:a16="http://schemas.microsoft.com/office/drawing/2014/main" id="{B868583A-F609-023E-D825-60BB28E9F63E}"/>
+              </a:ext>
+            </a:extLst>
+          </p:cNvPr>
+          <p:cNvSpPr/>
+          <p:nvPr/>
+        </p:nvSpPr>
+        <p:spPr>
+          <a:xfrm>
+            <a:off x="3617984" y="3601678"/>
+            <a:ext cx="3382178" cy="1300914"/>
+          </a:xfrm>
+          <a:custGeom>
+            <a:avLst/>
+            <a:gdLst>
+              <a:gd name="connsiteX0" fmla="*/ 3382178 w 3382178"/>
+              <a:gd name="connsiteY0" fmla="*/ 0 h 848299"/>
+              <a:gd name="connsiteX1" fmla="*/ 2335576 w 3382178"/>
+              <a:gd name="connsiteY1" fmla="*/ 506776 h 848299"/>
+              <a:gd name="connsiteX2" fmla="*/ 0 w 3382178"/>
+              <a:gd name="connsiteY2" fmla="*/ 848299 h 848299"/>
+            </a:gdLst>
+            <a:ahLst/>
+            <a:cxnLst>
+              <a:cxn ang="0">
+                <a:pos x="connsiteX0" y="connsiteY0"/>
+              </a:cxn>
+              <a:cxn ang="0">
+                <a:pos x="connsiteX1" y="connsiteY1"/>
+              </a:cxn>
+              <a:cxn ang="0">
+                <a:pos x="connsiteX2" y="connsiteY2"/>
+              </a:cxn>
+            </a:cxnLst>
+            <a:rect l="l" t="t" r="r" b="b"/>
+            <a:pathLst>
+              <a:path w="3382178" h="848299">
+                <a:moveTo>
+                  <a:pt x="3382178" y="0"/>
+                </a:moveTo>
+                <a:lnTo>
+                  <a:pt x="2335576" y="506776"/>
+                </a:lnTo>
+                <a:lnTo>
+                  <a:pt x="0" y="848299"/>
+                </a:lnTo>
+              </a:path>
+            </a:pathLst>
+          </a:custGeom>
+          <a:noFill/>
           <a:ln>
             <a:solidFill>
-              <a:schemeClr val="accent2"/>
+              <a:schemeClr val="accent3">
+                <a:lumMod val="75000"/>
+              </a:schemeClr>
             </a:solidFill>
             <a:prstDash val="dash"/>
             <a:headEnd type="none" w="med" len="med"/>
@@ -4419,41 +4823,87 @@
         </p:spPr>
         <p:style>
           <a:lnRef idx="2">
-            <a:schemeClr val="dk1"/>
+            <a:schemeClr val="accent1">
+              <a:shade val="15000"/>
+            </a:schemeClr>
           </a:lnRef>
-          <a:fillRef idx="0">
-            <a:schemeClr val="dk1"/>
+          <a:fillRef idx="1">
+            <a:schemeClr val="accent1"/>
           </a:fillRef>
-          <a:effectRef idx="1">
-            <a:schemeClr val="dk1"/>
+          <a:effectRef idx="0">
+            <a:schemeClr val="accent1"/>
           </a:effectRef>
           <a:fontRef idx="minor">
-            <a:schemeClr val="tx1"/>
+            <a:schemeClr val="lt1"/>
           </a:fontRef>
         </p:style>
-      </p:cxnSp>
-      <p:cxnSp>
-        <p:nvCxnSpPr>
-          <p:cNvPr id="67" name="Elbow Connector 66"/>
-          <p:cNvCxnSpPr>
-            <a:stCxn id="60" idx="4"/>
-            <a:endCxn id="49" idx="4"/>
-          </p:cNvCxnSpPr>
+        <p:txBody>
+          <a:bodyPr rtlCol="0" anchor="ctr"/>
+          <a:lstStyle/>
+          <a:p>
+            <a:pPr algn="ctr"/>
+            <a:endParaRPr lang="en-US"/>
+          </a:p>
+        </p:txBody>
+      </p:sp>
+      <p:sp>
+        <p:nvSpPr>
+          <p:cNvPr id="79" name="Freeform 78">
+            <a:extLst>
+              <a:ext uri="{FF2B5EF4-FFF2-40B4-BE49-F238E27FC236}">
+                <a16:creationId xmlns:a16="http://schemas.microsoft.com/office/drawing/2014/main" id="{D1E5E1F7-7195-B19F-5210-BED34719C47C}"/>
+              </a:ext>
+            </a:extLst>
+          </p:cNvPr>
+          <p:cNvSpPr/>
           <p:nvPr/>
-        </p:nvCxnSpPr>
+        </p:nvSpPr>
         <p:spPr>
           <a:xfrm>
-            <a:off x="6936870" y="3783726"/>
-            <a:ext cx="36917" cy="1484223"/>
-          </a:xfrm>
-          <a:prstGeom prst="bentConnector3">
-            <a:avLst>
-              <a:gd name="adj1" fmla="val 719227"/>
-            </a:avLst>
-          </a:prstGeom>
+            <a:off x="3536414" y="2787267"/>
+            <a:ext cx="3514381" cy="385591"/>
+          </a:xfrm>
+          <a:custGeom>
+            <a:avLst/>
+            <a:gdLst>
+              <a:gd name="connsiteX0" fmla="*/ 3514381 w 3514381"/>
+              <a:gd name="connsiteY0" fmla="*/ 352540 h 385591"/>
+              <a:gd name="connsiteX1" fmla="*/ 2258458 w 3514381"/>
+              <a:gd name="connsiteY1" fmla="*/ 0 h 385591"/>
+              <a:gd name="connsiteX2" fmla="*/ 0 w 3514381"/>
+              <a:gd name="connsiteY2" fmla="*/ 385591 h 385591"/>
+            </a:gdLst>
+            <a:ahLst/>
+            <a:cxnLst>
+              <a:cxn ang="0">
+                <a:pos x="connsiteX0" y="connsiteY0"/>
+              </a:cxn>
+              <a:cxn ang="0">
+                <a:pos x="connsiteX1" y="connsiteY1"/>
+              </a:cxn>
+              <a:cxn ang="0">
+                <a:pos x="connsiteX2" y="connsiteY2"/>
+              </a:cxn>
+            </a:cxnLst>
+            <a:rect l="l" t="t" r="r" b="b"/>
+            <a:pathLst>
+              <a:path w="3514381" h="385591">
+                <a:moveTo>
+                  <a:pt x="3514381" y="352540"/>
+                </a:moveTo>
+                <a:lnTo>
+                  <a:pt x="2258458" y="0"/>
+                </a:lnTo>
+                <a:lnTo>
+                  <a:pt x="0" y="385591"/>
+                </a:lnTo>
+              </a:path>
+            </a:pathLst>
+          </a:custGeom>
+          <a:noFill/>
           <a:ln>
             <a:solidFill>
-              <a:schemeClr val="accent2"/>
+              <a:srgbClr val="0070C0"/>
             </a:solidFill>
             <a:prstDash val="dash"/>
             <a:headEnd type="none" w="med" len="med"/>
@@ -4462,19 +4912,29 @@
         </p:spPr>
         <p:style>
           <a:lnRef idx="2">
-            <a:schemeClr val="dk1"/>
+            <a:schemeClr val="accent1">
+              <a:shade val="15000"/>
+            </a:schemeClr>
           </a:lnRef>
-          <a:fillRef idx="0">
-            <a:schemeClr val="dk1"/>
+          <a:fillRef idx="1">
+            <a:schemeClr val="accent1"/>
           </a:fillRef>
-          <a:effectRef idx="1">
-            <a:schemeClr val="dk1"/>
+          <a:effectRef idx="0">
+            <a:schemeClr val="accent1"/>
           </a:effectRef>
           <a:fontRef idx="minor">
-            <a:schemeClr val="tx1"/>
+            <a:schemeClr val="lt1"/>
           </a:fontRef>
         </p:style>
-      </p:cxnSp>
+        <p:txBody>
+          <a:bodyPr rtlCol="0" anchor="ctr"/>
+          <a:lstStyle/>
+          <a:p>
+            <a:pPr algn="ctr"/>
+            <a:endParaRPr lang="en-US"/>
+          </a:p>
+        </p:txBody>
+      </p:sp>
     </p:spTree>
     <p:extLst>
       <p:ext uri="{BB962C8B-B14F-4D97-AF65-F5344CB8AC3E}">

</xml_diff>